<commit_message>
Add Beer statistics pdf
</commit_message>
<xml_diff>
--- a/Presentation/Thesis.pptx
+++ b/Presentation/Thesis.pptx
@@ -4208,7 +4208,7 @@
                 <a16:creationId xmlns:a16="http://schemas.microsoft.com/office/drawing/2014/main" id="{1DB7C82F-AB7E-4F0C-B829-FA1B9C415180}"/>
               </a:ext>
               <a:ext uri="{C183D7F6-B498-43B3-948B-1728B52AA6E4}">
-                <adec:decorative xmlns:adec="http://schemas.microsoft.com/office/drawing/2017/decorative" xmlns="" val="1"/>
+                <adec:decorative xmlns="" xmlns:adec="http://schemas.microsoft.com/office/drawing/2017/decorative" val="1"/>
               </a:ext>
             </a:extLst>
           </p:cNvPr>
@@ -4591,7 +4591,7 @@
                 <a16:creationId xmlns:a16="http://schemas.microsoft.com/office/drawing/2014/main" id="{4F74D28C-3268-4E35-8EE1-D92CB4A85A7D}"/>
               </a:ext>
               <a:ext uri="{C183D7F6-B498-43B3-948B-1728B52AA6E4}">
-                <adec:decorative xmlns:adec="http://schemas.microsoft.com/office/drawing/2017/decorative" xmlns="" val="1"/>
+                <adec:decorative xmlns="" xmlns:adec="http://schemas.microsoft.com/office/drawing/2017/decorative" val="1"/>
               </a:ext>
             </a:extLst>
           </p:cNvPr>
@@ -4992,7 +4992,7 @@
                 <a:ea typeface="Gentium Plus" panose="02000503060000020004" pitchFamily="2" charset="0"/>
                 <a:cs typeface="Gentium Plus" panose="02000503060000020004" pitchFamily="2" charset="0"/>
               </a:rPr>
-              <a:t>Throw away beer (!)</a:t>
+              <a:t>Throw away beer sample (!)</a:t>
             </a:r>
           </a:p>
         </p:txBody>
@@ -5075,7 +5075,7 @@
                 <a16:creationId xmlns:a16="http://schemas.microsoft.com/office/drawing/2014/main" id="{CF62D2A7-8207-488C-9F46-316BA81A16C8}"/>
               </a:ext>
               <a:ext uri="{C183D7F6-B498-43B3-948B-1728B52AA6E4}">
-                <adec:decorative xmlns:adec="http://schemas.microsoft.com/office/drawing/2017/decorative" xmlns="" val="1"/>
+                <adec:decorative xmlns="" xmlns:adec="http://schemas.microsoft.com/office/drawing/2017/decorative" val="1"/>
               </a:ext>
             </a:extLst>
           </p:cNvPr>
@@ -5360,8 +5360,8 @@
         </p:nvSpPr>
         <p:spPr>
           <a:xfrm>
-            <a:off x="695739" y="1603512"/>
-            <a:ext cx="5314543" cy="3600851"/>
+            <a:off x="937591" y="1470993"/>
+            <a:ext cx="4482549" cy="3773128"/>
           </a:xfrm>
         </p:spPr>
         <p:txBody>
@@ -5518,7 +5518,7 @@
         </p:nvSpPr>
         <p:spPr>
           <a:xfrm>
-            <a:off x="357809" y="251791"/>
+            <a:off x="348987" y="450574"/>
             <a:ext cx="5652473" cy="830997"/>
           </a:xfrm>
           <a:prstGeom prst="rect">
@@ -5589,7 +5589,7 @@
                 <a16:creationId xmlns:a16="http://schemas.microsoft.com/office/drawing/2014/main" id="{3BAF1561-20C4-41FD-A35F-BF2B9E727F3E}"/>
               </a:ext>
               <a:ext uri="{C183D7F6-B498-43B3-948B-1728B52AA6E4}">
-                <adec:decorative xmlns="" xmlns:adec="http://schemas.microsoft.com/office/drawing/2017/decorative" val="1"/>
+                <adec:decorative xmlns:adec="http://schemas.microsoft.com/office/drawing/2017/decorative" xmlns="" val="1"/>
               </a:ext>
             </a:extLst>
           </p:cNvPr>
@@ -5687,7 +5687,7 @@
                 <a16:creationId xmlns:a16="http://schemas.microsoft.com/office/drawing/2014/main" id="{839DC788-B140-4F3E-A91E-CB3E70ED940A}"/>
               </a:ext>
               <a:ext uri="{C183D7F6-B498-43B3-948B-1728B52AA6E4}">
-                <adec:decorative xmlns="" xmlns:adec="http://schemas.microsoft.com/office/drawing/2017/decorative" val="1"/>
+                <adec:decorative xmlns:adec="http://schemas.microsoft.com/office/drawing/2017/decorative" xmlns="" val="1"/>
               </a:ext>
             </a:extLst>
           </p:cNvPr>
@@ -5782,7 +5782,7 @@
                 <a16:creationId xmlns:a16="http://schemas.microsoft.com/office/drawing/2014/main" id="{FC18D930-0EEE-448F-ABF1-2AA3C83DA552}"/>
               </a:ext>
               <a:ext uri="{C183D7F6-B498-43B3-948B-1728B52AA6E4}">
-                <adec:decorative xmlns="" xmlns:adec="http://schemas.microsoft.com/office/drawing/2017/decorative" val="1"/>
+                <adec:decorative xmlns:adec="http://schemas.microsoft.com/office/drawing/2017/decorative" xmlns="" val="1"/>
               </a:ext>
             </a:extLst>
           </p:cNvPr>
@@ -6099,7 +6099,7 @@
                 <a16:creationId xmlns:a16="http://schemas.microsoft.com/office/drawing/2014/main" id="{3BAF1561-20C4-41FD-A35F-BF2B9E727F3E}"/>
               </a:ext>
               <a:ext uri="{C183D7F6-B498-43B3-948B-1728B52AA6E4}">
-                <adec:decorative xmlns="" xmlns:adec="http://schemas.microsoft.com/office/drawing/2017/decorative" val="1"/>
+                <adec:decorative xmlns:adec="http://schemas.microsoft.com/office/drawing/2017/decorative" xmlns="" val="1"/>
               </a:ext>
             </a:extLst>
           </p:cNvPr>
@@ -6197,7 +6197,7 @@
                 <a16:creationId xmlns:a16="http://schemas.microsoft.com/office/drawing/2014/main" id="{839DC788-B140-4F3E-A91E-CB3E70ED940A}"/>
               </a:ext>
               <a:ext uri="{C183D7F6-B498-43B3-948B-1728B52AA6E4}">
-                <adec:decorative xmlns="" xmlns:adec="http://schemas.microsoft.com/office/drawing/2017/decorative" val="1"/>
+                <adec:decorative xmlns:adec="http://schemas.microsoft.com/office/drawing/2017/decorative" xmlns="" val="1"/>
               </a:ext>
             </a:extLst>
           </p:cNvPr>
@@ -6292,7 +6292,7 @@
                 <a16:creationId xmlns:a16="http://schemas.microsoft.com/office/drawing/2014/main" id="{FC18D930-0EEE-448F-ABF1-2AA3C83DA552}"/>
               </a:ext>
               <a:ext uri="{C183D7F6-B498-43B3-948B-1728B52AA6E4}">
-                <adec:decorative xmlns="" xmlns:adec="http://schemas.microsoft.com/office/drawing/2017/decorative" val="1"/>
+                <adec:decorative xmlns:adec="http://schemas.microsoft.com/office/drawing/2017/decorative" xmlns="" val="1"/>
               </a:ext>
             </a:extLst>
           </p:cNvPr>
@@ -6820,7 +6820,7 @@
                 <a16:creationId xmlns:a16="http://schemas.microsoft.com/office/drawing/2014/main" id="{9228552E-C8B1-4A80-8448-0787CE0FC704}"/>
               </a:ext>
               <a:ext uri="{C183D7F6-B498-43B3-948B-1728B52AA6E4}">
-                <adec:decorative xmlns="" xmlns:adec="http://schemas.microsoft.com/office/drawing/2017/decorative" val="1"/>
+                <adec:decorative xmlns:adec="http://schemas.microsoft.com/office/drawing/2017/decorative" xmlns="" val="1"/>
               </a:ext>
             </a:extLst>
           </p:cNvPr>

</xml_diff>